<commit_message>
updating slides, playing with li formatting
</commit_message>
<xml_diff>
--- a/js-bootcamp/js-bootcamp.pptx
+++ b/js-bootcamp/js-bootcamp.pptx
@@ -5,14 +5,16 @@
     <p:sldMasterId id="2147483648" r:id="rId1"/>
   </p:sldMasterIdLst>
   <p:notesMasterIdLst>
-    <p:notesMasterId r:id="rId7"/>
+    <p:notesMasterId r:id="rId9"/>
   </p:notesMasterIdLst>
   <p:sldIdLst>
     <p:sldId id="256" r:id="rId2"/>
     <p:sldId id="257" r:id="rId3"/>
-    <p:sldId id="258" r:id="rId4"/>
-    <p:sldId id="259" r:id="rId5"/>
-    <p:sldId id="260" r:id="rId6"/>
+    <p:sldId id="261" r:id="rId4"/>
+    <p:sldId id="258" r:id="rId5"/>
+    <p:sldId id="259" r:id="rId6"/>
+    <p:sldId id="262" r:id="rId7"/>
+    <p:sldId id="260" r:id="rId8"/>
   </p:sldIdLst>
   <p:sldSz cx="15544800" cy="9144000"/>
   <p:notesSz cx="6858000" cy="9144000"/>
@@ -197,7 +199,7 @@
             <a:fld id="{95A468CB-C26E-414D-9189-B9A62FE5FCA6}" type="datetimeFigureOut">
               <a:rPr lang="en-US" smtClean="0"/>
               <a:pPr/>
-              <a:t>10/3/2011</a:t>
+              <a:t>10/4/2011</a:t>
             </a:fld>
             <a:endParaRPr lang="en-US"/>
           </a:p>
@@ -645,7 +647,7 @@
             <a:fld id="{82E5D003-9D98-4EC5-8C49-449A98B92177}" type="datetimeFigureOut">
               <a:rPr lang="en-US" smtClean="0"/>
               <a:pPr/>
-              <a:t>10/3/2011</a:t>
+              <a:t>10/4/2011</a:t>
             </a:fld>
             <a:endParaRPr lang="en-US" dirty="0"/>
           </a:p>
@@ -919,7 +921,7 @@
             <a:fld id="{82E5D003-9D98-4EC5-8C49-449A98B92177}" type="datetimeFigureOut">
               <a:rPr lang="en-US" smtClean="0"/>
               <a:pPr/>
-              <a:t>10/3/2011</a:t>
+              <a:t>10/4/2011</a:t>
             </a:fld>
             <a:endParaRPr lang="en-US"/>
           </a:p>
@@ -1096,7 +1098,7 @@
             <a:fld id="{82E5D003-9D98-4EC5-8C49-449A98B92177}" type="datetimeFigureOut">
               <a:rPr lang="en-US" smtClean="0"/>
               <a:pPr/>
-              <a:t>10/3/2011</a:t>
+              <a:t>10/4/2011</a:t>
             </a:fld>
             <a:endParaRPr lang="en-US"/>
           </a:p>
@@ -1263,7 +1265,7 @@
             <a:fld id="{82E5D003-9D98-4EC5-8C49-449A98B92177}" type="datetimeFigureOut">
               <a:rPr lang="en-US" smtClean="0"/>
               <a:pPr/>
-              <a:t>10/3/2011</a:t>
+              <a:t>10/4/2011</a:t>
             </a:fld>
             <a:endParaRPr lang="en-US"/>
           </a:p>
@@ -1506,7 +1508,7 @@
             <a:fld id="{82E5D003-9D98-4EC5-8C49-449A98B92177}" type="datetimeFigureOut">
               <a:rPr lang="en-US" smtClean="0"/>
               <a:pPr/>
-              <a:t>10/3/2011</a:t>
+              <a:t>10/4/2011</a:t>
             </a:fld>
             <a:endParaRPr lang="en-US"/>
           </a:p>
@@ -1791,7 +1793,7 @@
             <a:fld id="{82E5D003-9D98-4EC5-8C49-449A98B92177}" type="datetimeFigureOut">
               <a:rPr lang="en-US" smtClean="0"/>
               <a:pPr/>
-              <a:t>10/3/2011</a:t>
+              <a:t>10/4/2011</a:t>
             </a:fld>
             <a:endParaRPr lang="en-US"/>
           </a:p>
@@ -2210,7 +2212,7 @@
             <a:fld id="{82E5D003-9D98-4EC5-8C49-449A98B92177}" type="datetimeFigureOut">
               <a:rPr lang="en-US" smtClean="0"/>
               <a:pPr/>
-              <a:t>10/3/2011</a:t>
+              <a:t>10/4/2011</a:t>
             </a:fld>
             <a:endParaRPr lang="en-US"/>
           </a:p>
@@ -2325,7 +2327,7 @@
             <a:fld id="{82E5D003-9D98-4EC5-8C49-449A98B92177}" type="datetimeFigureOut">
               <a:rPr lang="en-US" smtClean="0"/>
               <a:pPr/>
-              <a:t>10/3/2011</a:t>
+              <a:t>10/4/2011</a:t>
             </a:fld>
             <a:endParaRPr lang="en-US"/>
           </a:p>
@@ -2417,7 +2419,7 @@
             <a:fld id="{82E5D003-9D98-4EC5-8C49-449A98B92177}" type="datetimeFigureOut">
               <a:rPr lang="en-US" smtClean="0"/>
               <a:pPr/>
-              <a:t>10/3/2011</a:t>
+              <a:t>10/4/2011</a:t>
             </a:fld>
             <a:endParaRPr lang="en-US"/>
           </a:p>
@@ -2691,7 +2693,7 @@
             <a:fld id="{82E5D003-9D98-4EC5-8C49-449A98B92177}" type="datetimeFigureOut">
               <a:rPr lang="en-US" smtClean="0"/>
               <a:pPr/>
-              <a:t>10/3/2011</a:t>
+              <a:t>10/4/2011</a:t>
             </a:fld>
             <a:endParaRPr lang="en-US"/>
           </a:p>
@@ -2941,7 +2943,7 @@
             <a:fld id="{82E5D003-9D98-4EC5-8C49-449A98B92177}" type="datetimeFigureOut">
               <a:rPr lang="en-US" smtClean="0"/>
               <a:pPr/>
-              <a:t>10/3/2011</a:t>
+              <a:t>10/4/2011</a:t>
             </a:fld>
             <a:endParaRPr lang="en-US"/>
           </a:p>
@@ -3160,7 +3162,7 @@
             <a:fld id="{82E5D003-9D98-4EC5-8C49-449A98B92177}" type="datetimeFigureOut">
               <a:rPr lang="en-US" smtClean="0"/>
               <a:pPr/>
-              <a:t>10/3/2011</a:t>
+              <a:t>10/4/2011</a:t>
             </a:fld>
             <a:endParaRPr lang="en-US"/>
           </a:p>
@@ -3788,7 +3790,7 @@
           <a:p>
             <a:r>
               <a:rPr lang="en-US" dirty="0" smtClean="0"/>
-              <a:t>Why JavaScript?</a:t>
+              <a:t>A brief history</a:t>
             </a:r>
             <a:endParaRPr lang="en-US" dirty="0"/>
           </a:p>
@@ -3806,50 +3808,49 @@
         </p:nvSpPr>
         <p:spPr/>
         <p:txBody>
-          <a:bodyPr>
-            <a:normAutofit fontScale="92500" lnSpcReduction="10000"/>
-          </a:bodyPr>
-          <a:lstStyle/>
-          <a:p>
-            <a:r>
-              <a:rPr lang="en-US" dirty="0" smtClean="0"/>
-              <a:t>Interpreted</a:t>
-            </a:r>
-          </a:p>
-          <a:p>
-            <a:r>
-              <a:rPr lang="en-US" dirty="0" smtClean="0"/>
-              <a:t>Dynamically typed</a:t>
-            </a:r>
-          </a:p>
-          <a:p>
-            <a:r>
-              <a:rPr lang="en-US" dirty="0" smtClean="0"/>
-              <a:t>Highly extensible</a:t>
-            </a:r>
-          </a:p>
-          <a:p>
-            <a:r>
-              <a:rPr lang="en-US" dirty="0" smtClean="0"/>
-              <a:t>REALLY fast</a:t>
-            </a:r>
-          </a:p>
-          <a:p>
-            <a:r>
-              <a:rPr lang="en-US" dirty="0" smtClean="0"/>
-              <a:t>Cross-platform</a:t>
-            </a:r>
-          </a:p>
-          <a:p>
-            <a:r>
-              <a:rPr lang="en-US" dirty="0" smtClean="0"/>
-              <a:t>The single most important language in technology</a:t>
-            </a:r>
-          </a:p>
-          <a:p>
-            <a:r>
-              <a:rPr lang="en-US" dirty="0" smtClean="0"/>
-              <a:t>Future-proof</a:t>
+          <a:bodyPr/>
+          <a:lstStyle/>
+          <a:p>
+            <a:r>
+              <a:rPr lang="en-US" dirty="0" smtClean="0"/>
+              <a:t>Created in 1995 at Netscape</a:t>
+            </a:r>
+          </a:p>
+          <a:p>
+            <a:pPr lvl="1"/>
+            <a:r>
+              <a:rPr lang="en-US" dirty="0" smtClean="0"/>
+              <a:t>Originally called </a:t>
+            </a:r>
+            <a:r>
+              <a:rPr lang="en-US" dirty="0" err="1" smtClean="0"/>
+              <a:t>LiveScript</a:t>
+            </a:r>
+            <a:endParaRPr lang="en-US" dirty="0" smtClean="0"/>
+          </a:p>
+          <a:p>
+            <a:pPr lvl="1"/>
+            <a:r>
+              <a:rPr lang="en-US" dirty="0" smtClean="0"/>
+              <a:t>To provide browser hooks for Java Applets</a:t>
+            </a:r>
+          </a:p>
+          <a:p>
+            <a:r>
+              <a:rPr lang="en-US" dirty="0" smtClean="0"/>
+              <a:t>Implemented by Brendan </a:t>
+            </a:r>
+            <a:r>
+              <a:rPr lang="en-US" dirty="0" err="1" smtClean="0"/>
+              <a:t>Eich</a:t>
+            </a:r>
+            <a:endParaRPr lang="en-US" dirty="0" smtClean="0"/>
+          </a:p>
+          <a:p>
+            <a:pPr lvl="1"/>
+            <a:r>
+              <a:rPr lang="en-US" dirty="0" smtClean="0"/>
+              <a:t>It was implemented in 10 days</a:t>
             </a:r>
             <a:endParaRPr lang="en-US" dirty="0"/>
           </a:p>
@@ -3897,7 +3898,7 @@
           <a:p>
             <a:r>
               <a:rPr lang="en-US" dirty="0" smtClean="0"/>
-              <a:t>Where are we starting?</a:t>
+              <a:t>Why JavaScript?</a:t>
             </a:r>
             <a:endParaRPr lang="en-US" dirty="0"/>
           </a:p>
@@ -3915,27 +3916,52 @@
         </p:nvSpPr>
         <p:spPr/>
         <p:txBody>
-          <a:bodyPr/>
-          <a:lstStyle/>
-          <a:p>
-            <a:r>
-              <a:rPr lang="en-US" dirty="0" smtClean="0"/>
-              <a:t>Assuming SOME knowledge of JS</a:t>
-            </a:r>
-          </a:p>
-          <a:p>
-            <a:r>
-              <a:rPr lang="en-US" dirty="0" smtClean="0"/>
-              <a:t>Covering some common “</a:t>
-            </a:r>
-            <a:r>
-              <a:rPr lang="en-US" dirty="0" err="1" smtClean="0"/>
-              <a:t>gotchas</a:t>
-            </a:r>
-            <a:r>
-              <a:rPr lang="en-US" dirty="0" smtClean="0"/>
-              <a:t>”</a:t>
-            </a:r>
+          <a:bodyPr>
+            <a:normAutofit fontScale="92500" lnSpcReduction="10000"/>
+          </a:bodyPr>
+          <a:lstStyle/>
+          <a:p>
+            <a:r>
+              <a:rPr lang="en-US" dirty="0" smtClean="0"/>
+              <a:t>Interpreted</a:t>
+            </a:r>
+          </a:p>
+          <a:p>
+            <a:r>
+              <a:rPr lang="en-US" dirty="0" smtClean="0"/>
+              <a:t>Dynamically typed</a:t>
+            </a:r>
+          </a:p>
+          <a:p>
+            <a:r>
+              <a:rPr lang="en-US" dirty="0" smtClean="0"/>
+              <a:t>Highly extensible</a:t>
+            </a:r>
+          </a:p>
+          <a:p>
+            <a:r>
+              <a:rPr lang="en-US" dirty="0" smtClean="0"/>
+              <a:t>REALLY fast</a:t>
+            </a:r>
+          </a:p>
+          <a:p>
+            <a:r>
+              <a:rPr lang="en-US" dirty="0" smtClean="0"/>
+              <a:t>Cross-platform</a:t>
+            </a:r>
+          </a:p>
+          <a:p>
+            <a:r>
+              <a:rPr lang="en-US" dirty="0" smtClean="0"/>
+              <a:t>The single most important language in technology</a:t>
+            </a:r>
+          </a:p>
+          <a:p>
+            <a:r>
+              <a:rPr lang="en-US" dirty="0" smtClean="0"/>
+              <a:t>Future-proof</a:t>
+            </a:r>
+            <a:endParaRPr lang="en-US" dirty="0"/>
           </a:p>
         </p:txBody>
       </p:sp>
@@ -3981,7 +4007,7 @@
           <a:p>
             <a:r>
               <a:rPr lang="en-US" dirty="0" smtClean="0"/>
-              <a:t>Examples…</a:t>
+              <a:t>WTF.js?</a:t>
             </a:r>
             <a:endParaRPr lang="en-US" dirty="0"/>
           </a:p>
@@ -4004,17 +4030,296 @@
           <a:p>
             <a:r>
               <a:rPr lang="en-US" dirty="0" smtClean="0"/>
-              <a:t>Time to write some code</a:t>
-            </a:r>
-            <a:endParaRPr lang="en-US" dirty="0"/>
-          </a:p>
-        </p:txBody>
-      </p:sp>
+              <a:t>== </a:t>
+            </a:r>
+            <a:r>
+              <a:rPr lang="en-US" dirty="0" err="1" smtClean="0"/>
+              <a:t>vs</a:t>
+            </a:r>
+            <a:r>
+              <a:rPr lang="en-US" dirty="0" smtClean="0"/>
+              <a:t> ===</a:t>
+            </a:r>
+          </a:p>
+          <a:p>
+            <a:r>
+              <a:rPr lang="en-US" dirty="0" smtClean="0"/>
+              <a:t>null &amp; undefined</a:t>
+            </a:r>
+          </a:p>
+          <a:p>
+            <a:r>
+              <a:rPr lang="en-US" dirty="0" smtClean="0"/>
+              <a:t>Syntax oddities</a:t>
+            </a:r>
+          </a:p>
+          <a:p>
+            <a:r>
+              <a:rPr lang="en-US" dirty="0" smtClean="0"/>
+              <a:t>Global scope</a:t>
+            </a:r>
+          </a:p>
+        </p:txBody>
+      </p:sp>
+      <p:pic>
+        <p:nvPicPr>
+          <p:cNvPr id="1027" name="Picture 3"/>
+          <p:cNvPicPr>
+            <a:picLocks noChangeAspect="1" noChangeArrowheads="1"/>
+          </p:cNvPicPr>
+          <p:nvPr/>
+        </p:nvPicPr>
+        <p:blipFill>
+          <a:blip r:embed="rId2"/>
+          <a:srcRect/>
+          <a:stretch>
+            <a:fillRect/>
+          </a:stretch>
+        </p:blipFill>
+        <p:spPr bwMode="auto">
+          <a:xfrm>
+            <a:off x="7162800" y="2590800"/>
+            <a:ext cx="7143750" cy="5715000"/>
+          </a:xfrm>
+          <a:prstGeom prst="rect">
+            <a:avLst/>
+          </a:prstGeom>
+          <a:noFill/>
+          <a:ln w="9525">
+            <a:noFill/>
+            <a:miter lim="800000"/>
+            <a:headEnd/>
+            <a:tailEnd/>
+          </a:ln>
+          <a:effectLst/>
+        </p:spPr>
+      </p:pic>
     </p:spTree>
   </p:cSld>
   <p:clrMapOvr>
     <a:masterClrMapping/>
   </p:clrMapOvr>
+</p:sld>
+</file>
+
+<file path=ppt/slides/slide6.xml><?xml version="1.0" encoding="utf-8"?>
+<p:sld xmlns:a="http://schemas.openxmlformats.org/drawingml/2006/main" xmlns:r="http://schemas.openxmlformats.org/officeDocument/2006/relationships" xmlns:p="http://schemas.openxmlformats.org/presentationml/2006/main">
+  <p:cSld>
+    <p:spTree>
+      <p:nvGrpSpPr>
+        <p:cNvPr id="1" name=""/>
+        <p:cNvGrpSpPr/>
+        <p:nvPr/>
+      </p:nvGrpSpPr>
+      <p:grpSpPr>
+        <a:xfrm>
+          <a:off x="0" y="0"/>
+          <a:ext cx="0" cy="0"/>
+          <a:chOff x="0" y="0"/>
+          <a:chExt cx="0" cy="0"/>
+        </a:xfrm>
+      </p:grpSpPr>
+      <p:sp>
+        <p:nvSpPr>
+          <p:cNvPr id="2" name="Title 1"/>
+          <p:cNvSpPr>
+            <a:spLocks noGrp="1"/>
+          </p:cNvSpPr>
+          <p:nvPr>
+            <p:ph type="title"/>
+          </p:nvPr>
+        </p:nvSpPr>
+        <p:spPr/>
+        <p:txBody>
+          <a:bodyPr/>
+          <a:lstStyle/>
+          <a:p>
+            <a:r>
+              <a:rPr lang="en-US" dirty="0" smtClean="0"/>
+              <a:t>There’s good parts too</a:t>
+            </a:r>
+            <a:endParaRPr lang="en-US" dirty="0"/>
+          </a:p>
+        </p:txBody>
+      </p:sp>
+      <p:sp>
+        <p:nvSpPr>
+          <p:cNvPr id="3" name="Content Placeholder 2"/>
+          <p:cNvSpPr>
+            <a:spLocks noGrp="1"/>
+          </p:cNvSpPr>
+          <p:nvPr>
+            <p:ph idx="1"/>
+          </p:nvPr>
+        </p:nvSpPr>
+        <p:spPr/>
+        <p:txBody>
+          <a:bodyPr>
+            <a:normAutofit/>
+          </a:bodyPr>
+          <a:lstStyle/>
+          <a:p>
+            <a:r>
+              <a:rPr lang="en-US" dirty="0" smtClean="0"/>
+              <a:t>First class functions</a:t>
+            </a:r>
+          </a:p>
+          <a:p>
+            <a:r>
+              <a:rPr lang="en-US" dirty="0" smtClean="0"/>
+              <a:t>Closures</a:t>
+            </a:r>
+          </a:p>
+          <a:p>
+            <a:r>
+              <a:rPr lang="en-US" dirty="0" smtClean="0"/>
+              <a:t>Prototype</a:t>
+            </a:r>
+          </a:p>
+          <a:p>
+            <a:r>
+              <a:rPr lang="en-US" dirty="0" smtClean="0"/>
+              <a:t>Event Loop</a:t>
+            </a:r>
+            <a:endParaRPr lang="en-US" dirty="0"/>
+          </a:p>
+        </p:txBody>
+      </p:sp>
+      <p:pic>
+        <p:nvPicPr>
+          <p:cNvPr id="2051" name="Picture 3"/>
+          <p:cNvPicPr>
+            <a:picLocks noChangeAspect="1" noChangeArrowheads="1"/>
+          </p:cNvPicPr>
+          <p:nvPr/>
+        </p:nvPicPr>
+        <p:blipFill>
+          <a:blip r:embed="rId2"/>
+          <a:srcRect/>
+          <a:stretch>
+            <a:fillRect/>
+          </a:stretch>
+        </p:blipFill>
+        <p:spPr bwMode="auto">
+          <a:xfrm>
+            <a:off x="7543800" y="2819400"/>
+            <a:ext cx="6610350" cy="5048250"/>
+          </a:xfrm>
+          <a:prstGeom prst="rect">
+            <a:avLst/>
+          </a:prstGeom>
+          <a:noFill/>
+          <a:ln w="9525">
+            <a:noFill/>
+            <a:miter lim="800000"/>
+            <a:headEnd/>
+            <a:tailEnd/>
+          </a:ln>
+          <a:effectLst/>
+        </p:spPr>
+      </p:pic>
+    </p:spTree>
+  </p:cSld>
+  <p:clrMapOvr>
+    <a:masterClrMapping/>
+  </p:clrMapOvr>
+  <p:timing>
+    <p:tnLst>
+      <p:par>
+        <p:cTn id="1" dur="indefinite" restart="never" nodeType="tmRoot"/>
+      </p:par>
+    </p:tnLst>
+  </p:timing>
+</p:sld>
+</file>
+
+<file path=ppt/slides/slide7.xml><?xml version="1.0" encoding="utf-8"?>
+<p:sld xmlns:a="http://schemas.openxmlformats.org/drawingml/2006/main" xmlns:r="http://schemas.openxmlformats.org/officeDocument/2006/relationships" xmlns:p="http://schemas.openxmlformats.org/presentationml/2006/main">
+  <p:cSld>
+    <p:spTree>
+      <p:nvGrpSpPr>
+        <p:cNvPr id="1" name=""/>
+        <p:cNvGrpSpPr/>
+        <p:nvPr/>
+      </p:nvGrpSpPr>
+      <p:grpSpPr>
+        <a:xfrm>
+          <a:off x="0" y="0"/>
+          <a:ext cx="0" cy="0"/>
+          <a:chOff x="0" y="0"/>
+          <a:chExt cx="0" cy="0"/>
+        </a:xfrm>
+      </p:grpSpPr>
+      <p:sp>
+        <p:nvSpPr>
+          <p:cNvPr id="2" name="Title 1"/>
+          <p:cNvSpPr>
+            <a:spLocks noGrp="1"/>
+          </p:cNvSpPr>
+          <p:nvPr>
+            <p:ph type="title"/>
+          </p:nvPr>
+        </p:nvSpPr>
+        <p:spPr/>
+        <p:txBody>
+          <a:bodyPr/>
+          <a:lstStyle/>
+          <a:p>
+            <a:r>
+              <a:rPr lang="en-US" dirty="0" smtClean="0"/>
+              <a:t>Examples…</a:t>
+            </a:r>
+            <a:endParaRPr lang="en-US" dirty="0"/>
+          </a:p>
+        </p:txBody>
+      </p:sp>
+      <p:sp>
+        <p:nvSpPr>
+          <p:cNvPr id="3" name="Content Placeholder 2"/>
+          <p:cNvSpPr>
+            <a:spLocks noGrp="1"/>
+          </p:cNvSpPr>
+          <p:nvPr>
+            <p:ph idx="1"/>
+          </p:nvPr>
+        </p:nvSpPr>
+        <p:spPr/>
+        <p:txBody>
+          <a:bodyPr/>
+          <a:lstStyle/>
+          <a:p>
+            <a:r>
+              <a:rPr lang="en-US" dirty="0" smtClean="0"/>
+              <a:t>Time to write some code</a:t>
+            </a:r>
+          </a:p>
+          <a:p>
+            <a:endParaRPr lang="en-US" dirty="0" smtClean="0"/>
+          </a:p>
+          <a:p>
+            <a:pPr>
+              <a:buNone/>
+            </a:pPr>
+            <a:r>
+              <a:rPr lang="en-US" dirty="0" smtClean="0"/>
+              <a:t>https://github.com/jasonoffutt/refreshcache-2011</a:t>
+            </a:r>
+            <a:endParaRPr lang="en-US" dirty="0"/>
+          </a:p>
+        </p:txBody>
+      </p:sp>
+    </p:spTree>
+  </p:cSld>
+  <p:clrMapOvr>
+    <a:masterClrMapping/>
+  </p:clrMapOvr>
+  <p:timing>
+    <p:tnLst>
+      <p:par>
+        <p:cTn id="1" dur="indefinite" restart="never" nodeType="tmRoot"/>
+      </p:par>
+    </p:tnLst>
+  </p:timing>
 </p:sld>
 </file>
 

</xml_diff>

<commit_message>
adding more notes and minor tweaks to presentation
</commit_message>
<xml_diff>
--- a/js-bootcamp/js-bootcamp.pptx
+++ b/js-bootcamp/js-bootcamp.pptx
@@ -3853,7 +3853,11 @@
             </a:r>
             <a:r>
               <a:rPr lang="en-US" dirty="0" smtClean="0"/>
-              <a:t>, finally JavaScript</a:t>
+              <a:t>, finally names JavaScript when Sun </a:t>
+            </a:r>
+            <a:r>
+              <a:rPr lang="en-US" smtClean="0"/>
+              <a:t>became involved</a:t>
             </a:r>
             <a:endParaRPr lang="en-US" dirty="0" smtClean="0"/>
           </a:p>
@@ -3992,11 +3996,7 @@
             <a:pPr lvl="2"/>
             <a:r>
               <a:rPr lang="en-US" dirty="0" smtClean="0"/>
-              <a:t>Though not without </a:t>
-            </a:r>
-            <a:r>
-              <a:rPr lang="en-US" smtClean="0"/>
-              <a:t>some ugly bits</a:t>
+              <a:t>Though not without some ugly bits</a:t>
             </a:r>
             <a:endParaRPr lang="en-US" dirty="0" smtClean="0"/>
           </a:p>

</xml_diff>

<commit_message>
adding notes and code samples for closures and scope
</commit_message>
<xml_diff>
--- a/js-bootcamp/js-bootcamp.pptx
+++ b/js-bootcamp/js-bootcamp.pptx
@@ -5,7 +5,7 @@
     <p:sldMasterId id="2147483648" r:id="rId1"/>
   </p:sldMasterIdLst>
   <p:notesMasterIdLst>
-    <p:notesMasterId r:id="rId9"/>
+    <p:notesMasterId r:id="rId10"/>
   </p:notesMasterIdLst>
   <p:sldIdLst>
     <p:sldId id="256" r:id="rId2"/>
@@ -15,6 +15,7 @@
     <p:sldId id="259" r:id="rId6"/>
     <p:sldId id="262" r:id="rId7"/>
     <p:sldId id="260" r:id="rId8"/>
+    <p:sldId id="263" r:id="rId9"/>
   </p:sldIdLst>
   <p:sldSz cx="15544800" cy="9144000"/>
   <p:notesSz cx="6858000" cy="9144000"/>
@@ -199,7 +200,7 @@
             <a:fld id="{95A468CB-C26E-414D-9189-B9A62FE5FCA6}" type="datetimeFigureOut">
               <a:rPr lang="en-US" smtClean="0"/>
               <a:pPr/>
-              <a:t>10/5/2011</a:t>
+              <a:t>10/6/2011</a:t>
             </a:fld>
             <a:endParaRPr lang="en-US"/>
           </a:p>
@@ -765,7 +766,7 @@
             <a:fld id="{82E5D003-9D98-4EC5-8C49-449A98B92177}" type="datetimeFigureOut">
               <a:rPr lang="en-US" smtClean="0"/>
               <a:pPr/>
-              <a:t>10/5/2011</a:t>
+              <a:t>10/6/2011</a:t>
             </a:fld>
             <a:endParaRPr lang="en-US" dirty="0"/>
           </a:p>
@@ -1039,7 +1040,7 @@
             <a:fld id="{82E5D003-9D98-4EC5-8C49-449A98B92177}" type="datetimeFigureOut">
               <a:rPr lang="en-US" smtClean="0"/>
               <a:pPr/>
-              <a:t>10/5/2011</a:t>
+              <a:t>10/6/2011</a:t>
             </a:fld>
             <a:endParaRPr lang="en-US"/>
           </a:p>
@@ -1216,7 +1217,7 @@
             <a:fld id="{82E5D003-9D98-4EC5-8C49-449A98B92177}" type="datetimeFigureOut">
               <a:rPr lang="en-US" smtClean="0"/>
               <a:pPr/>
-              <a:t>10/5/2011</a:t>
+              <a:t>10/6/2011</a:t>
             </a:fld>
             <a:endParaRPr lang="en-US"/>
           </a:p>
@@ -1383,7 +1384,7 @@
             <a:fld id="{82E5D003-9D98-4EC5-8C49-449A98B92177}" type="datetimeFigureOut">
               <a:rPr lang="en-US" smtClean="0"/>
               <a:pPr/>
-              <a:t>10/5/2011</a:t>
+              <a:t>10/6/2011</a:t>
             </a:fld>
             <a:endParaRPr lang="en-US"/>
           </a:p>
@@ -1626,7 +1627,7 @@
             <a:fld id="{82E5D003-9D98-4EC5-8C49-449A98B92177}" type="datetimeFigureOut">
               <a:rPr lang="en-US" smtClean="0"/>
               <a:pPr/>
-              <a:t>10/5/2011</a:t>
+              <a:t>10/6/2011</a:t>
             </a:fld>
             <a:endParaRPr lang="en-US"/>
           </a:p>
@@ -1911,7 +1912,7 @@
             <a:fld id="{82E5D003-9D98-4EC5-8C49-449A98B92177}" type="datetimeFigureOut">
               <a:rPr lang="en-US" smtClean="0"/>
               <a:pPr/>
-              <a:t>10/5/2011</a:t>
+              <a:t>10/6/2011</a:t>
             </a:fld>
             <a:endParaRPr lang="en-US"/>
           </a:p>
@@ -2330,7 +2331,7 @@
             <a:fld id="{82E5D003-9D98-4EC5-8C49-449A98B92177}" type="datetimeFigureOut">
               <a:rPr lang="en-US" smtClean="0"/>
               <a:pPr/>
-              <a:t>10/5/2011</a:t>
+              <a:t>10/6/2011</a:t>
             </a:fld>
             <a:endParaRPr lang="en-US"/>
           </a:p>
@@ -2445,7 +2446,7 @@
             <a:fld id="{82E5D003-9D98-4EC5-8C49-449A98B92177}" type="datetimeFigureOut">
               <a:rPr lang="en-US" smtClean="0"/>
               <a:pPr/>
-              <a:t>10/5/2011</a:t>
+              <a:t>10/6/2011</a:t>
             </a:fld>
             <a:endParaRPr lang="en-US"/>
           </a:p>
@@ -2537,7 +2538,7 @@
             <a:fld id="{82E5D003-9D98-4EC5-8C49-449A98B92177}" type="datetimeFigureOut">
               <a:rPr lang="en-US" smtClean="0"/>
               <a:pPr/>
-              <a:t>10/5/2011</a:t>
+              <a:t>10/6/2011</a:t>
             </a:fld>
             <a:endParaRPr lang="en-US"/>
           </a:p>
@@ -2811,7 +2812,7 @@
             <a:fld id="{82E5D003-9D98-4EC5-8C49-449A98B92177}" type="datetimeFigureOut">
               <a:rPr lang="en-US" smtClean="0"/>
               <a:pPr/>
-              <a:t>10/5/2011</a:t>
+              <a:t>10/6/2011</a:t>
             </a:fld>
             <a:endParaRPr lang="en-US"/>
           </a:p>
@@ -3061,7 +3062,7 @@
             <a:fld id="{82E5D003-9D98-4EC5-8C49-449A98B92177}" type="datetimeFigureOut">
               <a:rPr lang="en-US" smtClean="0"/>
               <a:pPr/>
-              <a:t>10/5/2011</a:t>
+              <a:t>10/6/2011</a:t>
             </a:fld>
             <a:endParaRPr lang="en-US"/>
           </a:p>
@@ -3280,7 +3281,7 @@
             <a:fld id="{82E5D003-9D98-4EC5-8C49-449A98B92177}" type="datetimeFigureOut">
               <a:rPr lang="en-US" smtClean="0"/>
               <a:pPr/>
-              <a:t>10/5/2011</a:t>
+              <a:t>10/6/2011</a:t>
             </a:fld>
             <a:endParaRPr lang="en-US"/>
           </a:p>
@@ -3841,11 +3842,7 @@
             <a:pPr lvl="1"/>
             <a:r>
               <a:rPr lang="en-US" dirty="0" smtClean="0"/>
-              <a:t>Originally </a:t>
-            </a:r>
-            <a:r>
-              <a:rPr lang="en-US" dirty="0" smtClean="0"/>
-              <a:t>called Mocha, then </a:t>
+              <a:t>Originally called Mocha, then </a:t>
             </a:r>
             <a:r>
               <a:rPr lang="en-US" dirty="0" err="1" smtClean="0"/>
@@ -3853,13 +3850,16 @@
             </a:r>
             <a:r>
               <a:rPr lang="en-US" dirty="0" smtClean="0"/>
-              <a:t>, finally names JavaScript when Sun </a:t>
-            </a:r>
-            <a:r>
-              <a:rPr lang="en-US" smtClean="0"/>
-              <a:t>became involved</a:t>
-            </a:r>
-            <a:endParaRPr lang="en-US" dirty="0" smtClean="0"/>
+              <a:t>, finally </a:t>
+            </a:r>
+            <a:r>
+              <a:rPr lang="en-US" dirty="0" smtClean="0"/>
+              <a:t>named </a:t>
+            </a:r>
+            <a:r>
+              <a:rPr lang="en-US" dirty="0" smtClean="0"/>
+              <a:t>JavaScript when Sun became involved</a:t>
+            </a:r>
           </a:p>
           <a:p>
             <a:pPr lvl="1"/>
@@ -3871,11 +3871,7 @@
           <a:p>
             <a:r>
               <a:rPr lang="en-US" dirty="0" smtClean="0"/>
-              <a:t>Created </a:t>
-            </a:r>
-            <a:r>
-              <a:rPr lang="en-US" dirty="0" smtClean="0"/>
-              <a:t>by Brendan </a:t>
+              <a:t>Created by Brendan </a:t>
             </a:r>
             <a:r>
               <a:rPr lang="en-US" dirty="0" err="1" smtClean="0"/>
@@ -3887,11 +3883,7 @@
             <a:pPr lvl="1"/>
             <a:r>
               <a:rPr lang="en-US" dirty="0" smtClean="0"/>
-              <a:t>He was given 10 days to </a:t>
-            </a:r>
-            <a:r>
-              <a:rPr lang="en-US" dirty="0" smtClean="0"/>
-              <a:t>design and implement the language</a:t>
+              <a:t>He was given 10 days to design and implement the language</a:t>
             </a:r>
           </a:p>
           <a:p>
@@ -3985,11 +3977,7 @@
             <a:pPr lvl="1"/>
             <a:r>
               <a:rPr lang="en-US" dirty="0" smtClean="0"/>
-              <a:t>Elegantly designed object </a:t>
-            </a:r>
-            <a:r>
-              <a:rPr lang="en-US" dirty="0" smtClean="0"/>
-              <a:t>model</a:t>
+              <a:t>Elegantly designed object model</a:t>
             </a:r>
           </a:p>
           <a:p>
@@ -3998,7 +3986,6 @@
               <a:rPr lang="en-US" dirty="0" smtClean="0"/>
               <a:t>Though not without some ugly bits</a:t>
             </a:r>
-            <a:endParaRPr lang="en-US" dirty="0" smtClean="0"/>
           </a:p>
           <a:p>
             <a:pPr lvl="1"/>
@@ -4037,7 +4024,6 @@
               <a:rPr lang="en-US" dirty="0" smtClean="0"/>
               <a:t>, etc</a:t>
             </a:r>
-            <a:endParaRPr lang="en-US" dirty="0" smtClean="0"/>
           </a:p>
           <a:p>
             <a:pPr lvl="2"/>
@@ -4051,13 +4037,8 @@
             </a:r>
             <a:r>
               <a:rPr lang="en-US" dirty="0" smtClean="0"/>
-              <a:t>.</a:t>
-            </a:r>
-            <a:r>
-              <a:rPr lang="en-US" dirty="0" smtClean="0"/>
-              <a:t> MS, Apple, and Google represented on the board</a:t>
-            </a:r>
-            <a:endParaRPr lang="en-US" dirty="0" smtClean="0"/>
+              <a:t>. MS, Apple, and Google represented on the board</a:t>
+            </a:r>
           </a:p>
         </p:txBody>
       </p:sp>
@@ -4260,28 +4241,19 @@
           <a:p>
             <a:r>
               <a:rPr lang="en-US" dirty="0" smtClean="0"/>
-              <a:t>Syntax </a:t>
-            </a:r>
-            <a:r>
-              <a:rPr lang="en-US" dirty="0" smtClean="0"/>
-              <a:t>oddities</a:t>
+              <a:t>Syntax oddities</a:t>
             </a:r>
           </a:p>
           <a:p>
             <a:pPr lvl="1"/>
             <a:r>
               <a:rPr lang="en-US" dirty="0" err="1" smtClean="0"/>
-              <a:t>e</a:t>
-            </a:r>
-            <a:r>
-              <a:rPr lang="en-US" dirty="0" err="1" smtClean="0"/>
-              <a:t>val</a:t>
+              <a:t>eval</a:t>
             </a:r>
             <a:r>
               <a:rPr lang="en-US" dirty="0" smtClean="0"/>
               <a:t>, with, etc</a:t>
             </a:r>
-            <a:endParaRPr lang="en-US" dirty="0" smtClean="0"/>
           </a:p>
           <a:p>
             <a:r>
@@ -4405,16 +4377,11 @@
               <a:rPr lang="en-US" dirty="0" smtClean="0"/>
               <a:t>Prototypes</a:t>
             </a:r>
-            <a:endParaRPr lang="en-US" dirty="0" smtClean="0"/>
-          </a:p>
-          <a:p>
-            <a:r>
-              <a:rPr lang="en-US" dirty="0" smtClean="0"/>
-              <a:t>Event </a:t>
-            </a:r>
-            <a:r>
-              <a:rPr lang="en-US" dirty="0" smtClean="0"/>
-              <a:t>Loop</a:t>
+          </a:p>
+          <a:p>
+            <a:r>
+              <a:rPr lang="en-US" dirty="0" smtClean="0"/>
+              <a:t>Event Loop</a:t>
             </a:r>
           </a:p>
           <a:p>
@@ -4531,21 +4498,13 @@
           <a:p>
             <a:r>
               <a:rPr lang="en-US" dirty="0" smtClean="0"/>
-              <a:t>Time to write some code</a:t>
-            </a:r>
-          </a:p>
-          <a:p>
+              <a:t>Time to write some </a:t>
+            </a:r>
+            <a:r>
+              <a:rPr lang="en-US" dirty="0" smtClean="0"/>
+              <a:t>code</a:t>
+            </a:r>
             <a:endParaRPr lang="en-US" dirty="0" smtClean="0"/>
-          </a:p>
-          <a:p>
-            <a:pPr>
-              <a:buNone/>
-            </a:pPr>
-            <a:r>
-              <a:rPr lang="en-US" dirty="0" smtClean="0"/>
-              <a:t>https://github.com/jasonoffutt/refreshcache-2011</a:t>
-            </a:r>
-            <a:endParaRPr lang="en-US" dirty="0"/>
           </a:p>
         </p:txBody>
       </p:sp>
@@ -4561,6 +4520,54 @@
       </p:par>
     </p:tnLst>
   </p:timing>
+</p:sld>
+</file>
+
+<file path=ppt/slides/slide8.xml><?xml version="1.0" encoding="utf-8"?>
+<p:sld xmlns:a="http://schemas.openxmlformats.org/drawingml/2006/main" xmlns:r="http://schemas.openxmlformats.org/officeDocument/2006/relationships" xmlns:p="http://schemas.openxmlformats.org/presentationml/2006/main">
+  <p:cSld>
+    <p:spTree>
+      <p:nvGrpSpPr>
+        <p:cNvPr id="1" name=""/>
+        <p:cNvGrpSpPr/>
+        <p:nvPr/>
+      </p:nvGrpSpPr>
+      <p:grpSpPr>
+        <a:xfrm>
+          <a:off x="0" y="0"/>
+          <a:ext cx="0" cy="0"/>
+          <a:chOff x="0" y="0"/>
+          <a:chExt cx="0" cy="0"/>
+        </a:xfrm>
+      </p:grpSpPr>
+      <p:sp>
+        <p:nvSpPr>
+          <p:cNvPr id="2" name="Title 1"/>
+          <p:cNvSpPr>
+            <a:spLocks noGrp="1"/>
+          </p:cNvSpPr>
+          <p:nvPr>
+            <p:ph type="title"/>
+          </p:nvPr>
+        </p:nvSpPr>
+        <p:spPr/>
+        <p:txBody>
+          <a:bodyPr/>
+          <a:lstStyle/>
+          <a:p>
+            <a:r>
+              <a:rPr lang="en-US" dirty="0" smtClean="0"/>
+              <a:t>Questions?</a:t>
+            </a:r>
+            <a:endParaRPr lang="en-US" dirty="0"/>
+          </a:p>
+        </p:txBody>
+      </p:sp>
+    </p:spTree>
+  </p:cSld>
+  <p:clrMapOvr>
+    <a:masterClrMapping/>
+  </p:clrMapOvr>
 </p:sld>
 </file>
 

</xml_diff>